<commit_message>
21th commit - on branch 1.2 - Finishing  1.2
</commit_message>
<xml_diff>
--- a/Projet_4_Solution_fonctionnelle_et_technique.pptx
+++ b/Projet_4_Solution_fonctionnelle_et_technique.pptx
@@ -277,7 +277,7 @@
           <a:p>
             <a:fld id="{5BE96FD4-4427-443E-B153-7B15BC878EB4}" type="datetimeFigureOut">
               <a:rPr lang="fr-FR" smtClean="0"/>
-              <a:t>17/04/2020</a:t>
+              <a:t>23/04/2020</a:t>
             </a:fld>
             <a:endParaRPr lang="fr-FR"/>
           </a:p>
@@ -475,7 +475,7 @@
           <a:p>
             <a:fld id="{5BE96FD4-4427-443E-B153-7B15BC878EB4}" type="datetimeFigureOut">
               <a:rPr lang="fr-FR" smtClean="0"/>
-              <a:t>17/04/2020</a:t>
+              <a:t>23/04/2020</a:t>
             </a:fld>
             <a:endParaRPr lang="fr-FR"/>
           </a:p>
@@ -683,7 +683,7 @@
           <a:p>
             <a:fld id="{5BE96FD4-4427-443E-B153-7B15BC878EB4}" type="datetimeFigureOut">
               <a:rPr lang="fr-FR" smtClean="0"/>
-              <a:t>17/04/2020</a:t>
+              <a:t>23/04/2020</a:t>
             </a:fld>
             <a:endParaRPr lang="fr-FR"/>
           </a:p>
@@ -881,7 +881,7 @@
           <a:p>
             <a:fld id="{5BE96FD4-4427-443E-B153-7B15BC878EB4}" type="datetimeFigureOut">
               <a:rPr lang="fr-FR" smtClean="0"/>
-              <a:t>17/04/2020</a:t>
+              <a:t>23/04/2020</a:t>
             </a:fld>
             <a:endParaRPr lang="fr-FR"/>
           </a:p>
@@ -1156,7 +1156,7 @@
           <a:p>
             <a:fld id="{5BE96FD4-4427-443E-B153-7B15BC878EB4}" type="datetimeFigureOut">
               <a:rPr lang="fr-FR" smtClean="0"/>
-              <a:t>17/04/2020</a:t>
+              <a:t>23/04/2020</a:t>
             </a:fld>
             <a:endParaRPr lang="fr-FR"/>
           </a:p>
@@ -1421,7 +1421,7 @@
           <a:p>
             <a:fld id="{5BE96FD4-4427-443E-B153-7B15BC878EB4}" type="datetimeFigureOut">
               <a:rPr lang="fr-FR" smtClean="0"/>
-              <a:t>17/04/2020</a:t>
+              <a:t>23/04/2020</a:t>
             </a:fld>
             <a:endParaRPr lang="fr-FR"/>
           </a:p>
@@ -1833,7 +1833,7 @@
           <a:p>
             <a:fld id="{5BE96FD4-4427-443E-B153-7B15BC878EB4}" type="datetimeFigureOut">
               <a:rPr lang="fr-FR" smtClean="0"/>
-              <a:t>17/04/2020</a:t>
+              <a:t>23/04/2020</a:t>
             </a:fld>
             <a:endParaRPr lang="fr-FR"/>
           </a:p>
@@ -1974,7 +1974,7 @@
           <a:p>
             <a:fld id="{5BE96FD4-4427-443E-B153-7B15BC878EB4}" type="datetimeFigureOut">
               <a:rPr lang="fr-FR" smtClean="0"/>
-              <a:t>17/04/2020</a:t>
+              <a:t>23/04/2020</a:t>
             </a:fld>
             <a:endParaRPr lang="fr-FR"/>
           </a:p>
@@ -2087,7 +2087,7 @@
           <a:p>
             <a:fld id="{5BE96FD4-4427-443E-B153-7B15BC878EB4}" type="datetimeFigureOut">
               <a:rPr lang="fr-FR" smtClean="0"/>
-              <a:t>17/04/2020</a:t>
+              <a:t>23/04/2020</a:t>
             </a:fld>
             <a:endParaRPr lang="fr-FR"/>
           </a:p>
@@ -2398,7 +2398,7 @@
           <a:p>
             <a:fld id="{5BE96FD4-4427-443E-B153-7B15BC878EB4}" type="datetimeFigureOut">
               <a:rPr lang="fr-FR" smtClean="0"/>
-              <a:t>17/04/2020</a:t>
+              <a:t>23/04/2020</a:t>
             </a:fld>
             <a:endParaRPr lang="fr-FR"/>
           </a:p>
@@ -2686,7 +2686,7 @@
           <a:p>
             <a:fld id="{5BE96FD4-4427-443E-B153-7B15BC878EB4}" type="datetimeFigureOut">
               <a:rPr lang="fr-FR" smtClean="0"/>
-              <a:t>17/04/2020</a:t>
+              <a:t>23/04/2020</a:t>
             </a:fld>
             <a:endParaRPr lang="fr-FR"/>
           </a:p>
@@ -2927,7 +2927,7 @@
           <a:p>
             <a:fld id="{5BE96FD4-4427-443E-B153-7B15BC878EB4}" type="datetimeFigureOut">
               <a:rPr lang="fr-FR" smtClean="0"/>
-              <a:t>17/04/2020</a:t>
+              <a:t>23/04/2020</a:t>
             </a:fld>
             <a:endParaRPr lang="fr-FR"/>
           </a:p>
@@ -3363,24 +3363,24 @@
         <p:spPr/>
         <p:txBody>
           <a:bodyPr>
-            <a:normAutofit lnSpcReduction="10000"/>
+            <a:normAutofit fontScale="92500" lnSpcReduction="20000"/>
           </a:bodyPr>
           <a:lstStyle/>
           <a:p>
             <a:r>
-              <a:rPr lang="fr-FR" b="1" dirty="0"/>
+              <a:rPr lang="fr-FR" sz="3200" b="1" dirty="0"/>
               <a:t>Boutique en ligne </a:t>
             </a:r>
           </a:p>
           <a:p>
             <a:r>
-              <a:rPr lang="fr-FR" b="1" dirty="0"/>
+              <a:rPr lang="fr-FR" sz="3200" b="1" dirty="0"/>
               <a:t>&amp; </a:t>
             </a:r>
           </a:p>
           <a:p>
             <a:r>
-              <a:rPr lang="fr-FR" b="1" dirty="0"/>
+              <a:rPr lang="fr-FR" sz="3200" b="1" dirty="0"/>
               <a:t>Site de gestion centralisée</a:t>
             </a:r>
           </a:p>

</xml_diff>